<commit_message>
final update for EUM and FOSDEM slides
</commit_message>
<xml_diff>
--- a/docs/slides/buildtest-fosdem20.pptx
+++ b/docs/slides/buildtest-fosdem20.pptx
@@ -17,7 +17,7 @@
     <p:sldId id="327" r:id="rId5"/>
     <p:sldId id="328" r:id="rId6"/>
     <p:sldId id="281" r:id="rId7"/>
-    <p:sldId id="329" r:id="rId8"/>
+    <p:sldId id="333" r:id="rId8"/>
     <p:sldId id="318" r:id="rId9"/>
     <p:sldId id="331" r:id="rId10"/>
     <p:sldId id="322" r:id="rId11"/>
@@ -215,7 +215,7 @@
           <a:p>
             <a:fld id="{B5139EE7-F5F4-4B3A-8A0E-EA89B534D63A}" type="datetimeFigureOut">
               <a:rPr lang="en-US" smtClean="0"/>
-              <a:t>1/27/2020</a:t>
+              <a:t>1/29/2020</a:t>
             </a:fld>
             <a:endParaRPr lang="en-US"/>
           </a:p>
@@ -380,7 +380,7 @@
           <a:p>
             <a:fld id="{7DACDAAE-EBA2-4B2E-964A-6E28AA2C2BFD}" type="datetimeFigureOut">
               <a:rPr lang="en-US" smtClean="0"/>
-              <a:t>1/27/2020</a:t>
+              <a:t>1/29/2020</a:t>
             </a:fld>
             <a:endParaRPr lang="en-US"/>
           </a:p>
@@ -973,7 +973,7 @@
     </p:spTree>
     <p:extLst>
       <p:ext uri="{BB962C8B-B14F-4D97-AF65-F5344CB8AC3E}">
-        <p14:creationId xmlns:p14="http://schemas.microsoft.com/office/powerpoint/2010/main" val="760658707"/>
+        <p14:creationId xmlns:p14="http://schemas.microsoft.com/office/powerpoint/2010/main" val="897765386"/>
       </p:ext>
     </p:extLst>
   </p:cSld>
@@ -1875,7 +1875,7 @@
           <a:p>
             <a:fld id="{FDD1EB90-66D6-4EAB-A2CD-4ED4AEBF2056}" type="datetime1">
               <a:rPr lang="en-US" smtClean="0"/>
-              <a:t>1/27/2020</a:t>
+              <a:t>1/29/2020</a:t>
             </a:fld>
             <a:endParaRPr lang="en-US" dirty="0"/>
           </a:p>
@@ -2147,7 +2147,7 @@
           <a:p>
             <a:fld id="{3CED6869-A345-4FF7-8CBC-D5BD39DFA229}" type="datetime1">
               <a:rPr lang="en-US" smtClean="0"/>
-              <a:t>1/27/2020</a:t>
+              <a:t>1/29/2020</a:t>
             </a:fld>
             <a:endParaRPr lang="en-US" dirty="0"/>
           </a:p>
@@ -2482,7 +2482,7 @@
           <a:p>
             <a:fld id="{A2C8709C-9479-41A8-BB29-3B949A3A3080}" type="datetime1">
               <a:rPr lang="en-US" smtClean="0"/>
-              <a:t>1/27/2020</a:t>
+              <a:t>1/29/2020</a:t>
             </a:fld>
             <a:endParaRPr lang="en-US" dirty="0"/>
           </a:p>
@@ -2830,7 +2830,7 @@
           <a:p>
             <a:fld id="{43DA29A6-CFC1-4FC3-BB9F-837DE0C30955}" type="datetime1">
               <a:rPr lang="en-US" smtClean="0"/>
-              <a:t>1/27/2020</a:t>
+              <a:t>1/29/2020</a:t>
             </a:fld>
             <a:endParaRPr lang="en-US" dirty="0"/>
           </a:p>
@@ -3165,7 +3165,7 @@
           <a:p>
             <a:fld id="{35F33F56-9C7E-4714-846E-AE4F62FD667D}" type="datetime1">
               <a:rPr lang="en-US" smtClean="0"/>
-              <a:t>1/27/2020</a:t>
+              <a:t>1/29/2020</a:t>
             </a:fld>
             <a:endParaRPr lang="en-US" dirty="0"/>
           </a:p>
@@ -3573,7 +3573,7 @@
           <a:p>
             <a:fld id="{E93A94EC-C580-41CD-8E4F-3F1347ACAF9C}" type="datetime1">
               <a:rPr lang="en-US" smtClean="0"/>
-              <a:t>1/27/2020</a:t>
+              <a:t>1/29/2020</a:t>
             </a:fld>
             <a:endParaRPr lang="en-US" dirty="0"/>
           </a:p>
@@ -3764,7 +3764,7 @@
           <a:p>
             <a:fld id="{531DFE1B-5441-4622-AEB8-B3E020CA0030}" type="datetime1">
               <a:rPr lang="en-US" smtClean="0"/>
-              <a:t>1/27/2020</a:t>
+              <a:t>1/29/2020</a:t>
             </a:fld>
             <a:endParaRPr lang="en-US" dirty="0"/>
           </a:p>
@@ -3964,7 +3964,7 @@
           <a:p>
             <a:fld id="{3F45F4EA-AB0C-43D3-B864-3ED0EFA9CED7}" type="datetime1">
               <a:rPr lang="en-US" smtClean="0"/>
-              <a:t>1/27/2020</a:t>
+              <a:t>1/29/2020</a:t>
             </a:fld>
             <a:endParaRPr lang="en-US" dirty="0"/>
           </a:p>
@@ -4445,7 +4445,7 @@
             <a:fld id="{B61BEF0D-F0BB-DE4B-95CE-6DB70DBA9567}" type="datetimeFigureOut">
               <a:rPr lang="en-US" dirty="0"/>
               <a:pPr/>
-              <a:t>1/27/2020</a:t>
+              <a:t>1/29/2020</a:t>
             </a:fld>
             <a:endParaRPr lang="en-US" dirty="0"/>
           </a:p>
@@ -4734,7 +4734,7 @@
             <a:fld id="{B61BEF0D-F0BB-DE4B-95CE-6DB70DBA9567}" type="datetimeFigureOut">
               <a:rPr lang="en-US" dirty="0"/>
               <a:pPr/>
-              <a:t>1/27/2020</a:t>
+              <a:t>1/29/2020</a:t>
             </a:fld>
             <a:endParaRPr lang="en-US" dirty="0"/>
           </a:p>
@@ -5011,7 +5011,7 @@
           <a:p>
             <a:fld id="{EB712588-04B1-427B-82EE-E8DB90309F08}" type="datetimeFigureOut">
               <a:rPr lang="en-US" dirty="0"/>
-              <a:t>1/27/2020</a:t>
+              <a:t>1/29/2020</a:t>
             </a:fld>
             <a:endParaRPr lang="en-US" dirty="0"/>
           </a:p>
@@ -5527,7 +5527,7 @@
             <a:fld id="{B61BEF0D-F0BB-DE4B-95CE-6DB70DBA9567}" type="datetimeFigureOut">
               <a:rPr lang="en-US" dirty="0"/>
               <a:pPr/>
-              <a:t>1/27/2020</a:t>
+              <a:t>1/29/2020</a:t>
             </a:fld>
             <a:endParaRPr lang="en-US" dirty="0"/>
           </a:p>
@@ -5950,7 +5950,7 @@
           <a:p>
             <a:fld id="{7B4145CB-F74C-4C63-A0CD-E2D68B015431}" type="datetime1">
               <a:rPr lang="en-US" smtClean="0"/>
-              <a:t>1/27/2020</a:t>
+              <a:t>1/29/2020</a:t>
             </a:fld>
             <a:endParaRPr lang="en-US" dirty="0"/>
           </a:p>
@@ -6067,7 +6067,7 @@
           <a:p>
             <a:fld id="{548F98D1-A8EC-47B3-B2A9-2FC32046FE0B}" type="datetime1">
               <a:rPr lang="en-US" smtClean="0"/>
-              <a:t>1/27/2020</a:t>
+              <a:t>1/29/2020</a:t>
             </a:fld>
             <a:endParaRPr lang="en-US" dirty="0"/>
           </a:p>
@@ -6343,7 +6343,7 @@
           <a:p>
             <a:fld id="{7F1A02CA-B004-4CFD-B838-D3FA10E3E8CA}" type="datetime1">
               <a:rPr lang="en-US" smtClean="0"/>
-              <a:t>1/27/2020</a:t>
+              <a:t>1/29/2020</a:t>
             </a:fld>
             <a:endParaRPr lang="en-US" dirty="0"/>
           </a:p>
@@ -6626,7 +6626,7 @@
           <a:p>
             <a:fld id="{021B6B48-41A9-4071-9958-B559F4E41312}" type="datetime1">
               <a:rPr lang="en-US" smtClean="0"/>
-              <a:t>1/27/2020</a:t>
+              <a:t>1/29/2020</a:t>
             </a:fld>
             <a:endParaRPr lang="en-US" dirty="0"/>
           </a:p>
@@ -7392,7 +7392,7 @@
           <a:p>
             <a:fld id="{7B4145CB-F74C-4C63-A0CD-E2D68B015431}" type="datetime1">
               <a:rPr lang="en-US" smtClean="0"/>
-              <a:t>1/27/2020</a:t>
+              <a:t>1/29/2020</a:t>
             </a:fld>
             <a:endParaRPr lang="en-US" dirty="0"/>
           </a:p>
@@ -8036,7 +8036,7 @@
                 <a:hlinkClick r:id="rId3">
                   <a:extLst>
                     <a:ext uri="{A12FA001-AC4F-418D-AE19-62706E023703}">
-                      <ahyp:hlinkClr xmlns:ahyp="http://schemas.microsoft.com/office/drawing/2018/hyperlinkcolor" xmlns="" val="tx"/>
+                      <ahyp:hlinkClr xmlns="" xmlns:ahyp="http://schemas.microsoft.com/office/drawing/2018/hyperlinkcolor" val="tx"/>
                     </a:ext>
                   </a:extLst>
                 </a:hlinkClick>
@@ -9326,7 +9326,7 @@
                           <a:hlinkClick r:id="rId2">
                             <a:extLst>
                               <a:ext uri="{A12FA001-AC4F-418D-AE19-62706E023703}">
-                                <ahyp:hlinkClr xmlns:ahyp="http://schemas.microsoft.com/office/drawing/2018/hyperlinkcolor" xmlns="" val="tx"/>
+                                <ahyp:hlinkClr xmlns="" xmlns:ahyp="http://schemas.microsoft.com/office/drawing/2018/hyperlinkcolor" val="tx"/>
                               </a:ext>
                             </a:extLst>
                           </a:hlinkClick>
@@ -9482,7 +9482,7 @@
                           <a:hlinkClick r:id="rId2">
                             <a:extLst>
                               <a:ext uri="{A12FA001-AC4F-418D-AE19-62706E023703}">
-                                <ahyp:hlinkClr xmlns:ahyp="http://schemas.microsoft.com/office/drawing/2018/hyperlinkcolor" xmlns="" val="tx"/>
+                                <ahyp:hlinkClr xmlns="" xmlns:ahyp="http://schemas.microsoft.com/office/drawing/2018/hyperlinkcolor" val="tx"/>
                               </a:ext>
                             </a:extLst>
                           </a:hlinkClick>
@@ -9638,7 +9638,7 @@
                           <a:hlinkClick r:id="rId3">
                             <a:extLst>
                               <a:ext uri="{A12FA001-AC4F-418D-AE19-62706E023703}">
-                                <ahyp:hlinkClr xmlns:ahyp="http://schemas.microsoft.com/office/drawing/2018/hyperlinkcolor" xmlns="" val="tx"/>
+                                <ahyp:hlinkClr xmlns="" xmlns:ahyp="http://schemas.microsoft.com/office/drawing/2018/hyperlinkcolor" val="tx"/>
                               </a:ext>
                             </a:extLst>
                           </a:hlinkClick>
@@ -9794,7 +9794,7 @@
                           <a:hlinkClick r:id="rId4">
                             <a:extLst>
                               <a:ext uri="{A12FA001-AC4F-418D-AE19-62706E023703}">
-                                <ahyp:hlinkClr xmlns:ahyp="http://schemas.microsoft.com/office/drawing/2018/hyperlinkcolor" xmlns="" val="tx"/>
+                                <ahyp:hlinkClr xmlns="" xmlns:ahyp="http://schemas.microsoft.com/office/drawing/2018/hyperlinkcolor" val="tx"/>
                               </a:ext>
                             </a:extLst>
                           </a:hlinkClick>
@@ -9959,7 +9959,7 @@
                           <a:hlinkClick r:id="rId5">
                             <a:extLst>
                               <a:ext uri="{A12FA001-AC4F-418D-AE19-62706E023703}">
-                                <ahyp:hlinkClr xmlns:ahyp="http://schemas.microsoft.com/office/drawing/2018/hyperlinkcolor" xmlns="" val="tx"/>
+                                <ahyp:hlinkClr xmlns="" xmlns:ahyp="http://schemas.microsoft.com/office/drawing/2018/hyperlinkcolor" val="tx"/>
                               </a:ext>
                             </a:extLst>
                           </a:hlinkClick>
@@ -10120,7 +10120,7 @@
                           <a:hlinkClick r:id="rId6">
                             <a:extLst>
                               <a:ext uri="{A12FA001-AC4F-418D-AE19-62706E023703}">
-                                <ahyp:hlinkClr xmlns:ahyp="http://schemas.microsoft.com/office/drawing/2018/hyperlinkcolor" xmlns="" val="tx"/>
+                                <ahyp:hlinkClr xmlns="" xmlns:ahyp="http://schemas.microsoft.com/office/drawing/2018/hyperlinkcolor" val="tx"/>
                               </a:ext>
                             </a:extLst>
                           </a:hlinkClick>
@@ -10276,7 +10276,7 @@
                           <a:hlinkClick r:id="rId7">
                             <a:extLst>
                               <a:ext uri="{A12FA001-AC4F-418D-AE19-62706E023703}">
-                                <ahyp:hlinkClr xmlns:ahyp="http://schemas.microsoft.com/office/drawing/2018/hyperlinkcolor" xmlns="" val="tx"/>
+                                <ahyp:hlinkClr xmlns="" xmlns:ahyp="http://schemas.microsoft.com/office/drawing/2018/hyperlinkcolor" val="tx"/>
                               </a:ext>
                             </a:extLst>
                           </a:hlinkClick>
@@ -10451,7 +10451,7 @@
                           <a:hlinkClick r:id="rId8">
                             <a:extLst>
                               <a:ext uri="{A12FA001-AC4F-418D-AE19-62706E023703}">
-                                <ahyp:hlinkClr xmlns:ahyp="http://schemas.microsoft.com/office/drawing/2018/hyperlinkcolor" xmlns="" val="tx"/>
+                                <ahyp:hlinkClr xmlns="" xmlns:ahyp="http://schemas.microsoft.com/office/drawing/2018/hyperlinkcolor" val="tx"/>
                               </a:ext>
                             </a:extLst>
                           </a:hlinkClick>
@@ -10616,7 +10616,7 @@
                           <a:hlinkClick r:id="rId9">
                             <a:extLst>
                               <a:ext uri="{A12FA001-AC4F-418D-AE19-62706E023703}">
-                                <ahyp:hlinkClr xmlns:ahyp="http://schemas.microsoft.com/office/drawing/2018/hyperlinkcolor" xmlns="" val="tx"/>
+                                <ahyp:hlinkClr xmlns="" xmlns:ahyp="http://schemas.microsoft.com/office/drawing/2018/hyperlinkcolor" val="tx"/>
                               </a:ext>
                             </a:extLst>
                           </a:hlinkClick>
@@ -10781,7 +10781,7 @@
                           <a:hlinkClick r:id="rId10">
                             <a:extLst>
                               <a:ext uri="{A12FA001-AC4F-418D-AE19-62706E023703}">
-                                <ahyp:hlinkClr xmlns:ahyp="http://schemas.microsoft.com/office/drawing/2018/hyperlinkcolor" xmlns="" val="tx"/>
+                                <ahyp:hlinkClr xmlns="" xmlns:ahyp="http://schemas.microsoft.com/office/drawing/2018/hyperlinkcolor" val="tx"/>
                               </a:ext>
                             </a:extLst>
                           </a:hlinkClick>
@@ -10946,7 +10946,7 @@
                           <a:hlinkClick r:id="rId11">
                             <a:extLst>
                               <a:ext uri="{A12FA001-AC4F-418D-AE19-62706E023703}">
-                                <ahyp:hlinkClr xmlns:ahyp="http://schemas.microsoft.com/office/drawing/2018/hyperlinkcolor" xmlns="" val="tx"/>
+                                <ahyp:hlinkClr xmlns="" xmlns:ahyp="http://schemas.microsoft.com/office/drawing/2018/hyperlinkcolor" val="tx"/>
                               </a:ext>
                             </a:extLst>
                           </a:hlinkClick>
@@ -11110,8 +11110,21 @@
             <a:pPr lvl="1"/>
             <a:r>
               <a:rPr lang="en-US" dirty="0"/>
-              <a:t>The framework is capable of testing of installed software in HPC SW stack</a:t>
-            </a:r>
+              <a:t>The framework is capable of testing of installed software in HPC </a:t>
+            </a:r>
+            <a:r>
+              <a:rPr lang="en-US" dirty="0" smtClean="0"/>
+              <a:t>Software </a:t>
+            </a:r>
+            <a:r>
+              <a:rPr lang="en-US" dirty="0"/>
+              <a:t>S</a:t>
+            </a:r>
+            <a:r>
+              <a:rPr lang="en-US" dirty="0" smtClean="0"/>
+              <a:t>tack</a:t>
+            </a:r>
+            <a:endParaRPr lang="en-US" dirty="0"/>
           </a:p>
           <a:p>
             <a:pPr lvl="1"/>
@@ -11138,7 +11151,15 @@
             <a:pPr lvl="1"/>
             <a:r>
               <a:rPr lang="en-US" dirty="0"/>
-              <a:t>The framework provides contains a test repository that is community driven</a:t>
+              <a:t>The framework provides </a:t>
+            </a:r>
+            <a:r>
+              <a:rPr lang="en-US" dirty="0" smtClean="0"/>
+              <a:t>a </a:t>
+            </a:r>
+            <a:r>
+              <a:rPr lang="en-US" dirty="0"/>
+              <a:t>test repository that is community driven</a:t>
             </a:r>
           </a:p>
           <a:p>
@@ -11309,7 +11330,7 @@
                 <a16:creationId xmlns:a16="http://schemas.microsoft.com/office/drawing/2014/main" id="{9F4444CE-BC8D-4D61-B303-4C05614E62AB}"/>
               </a:ext>
               <a:ext uri="{C183D7F6-B498-43B3-948B-1728B52AA6E4}">
-                <adec:decorative xmlns:adec="http://schemas.microsoft.com/office/drawing/2017/decorative" xmlns="" val="1"/>
+                <adec:decorative xmlns="" xmlns:adec="http://schemas.microsoft.com/office/drawing/2017/decorative" val="1"/>
               </a:ext>
             </a:extLst>
           </p:cNvPr>
@@ -11369,7 +11390,7 @@
                 <a16:creationId xmlns:a16="http://schemas.microsoft.com/office/drawing/2014/main" id="{62423CA5-E2E1-4789-B759-9906C1C94063}"/>
               </a:ext>
               <a:ext uri="{C183D7F6-B498-43B3-948B-1728B52AA6E4}">
-                <adec:decorative xmlns:adec="http://schemas.microsoft.com/office/drawing/2017/decorative" xmlns="" val="1"/>
+                <adec:decorative xmlns="" xmlns:adec="http://schemas.microsoft.com/office/drawing/2017/decorative" val="1"/>
               </a:ext>
             </a:extLst>
           </p:cNvPr>
@@ -11430,7 +11451,7 @@
                 <a16:creationId xmlns:a16="http://schemas.microsoft.com/office/drawing/2014/main" id="{73772B81-181F-48B7-8826-4D9686D15DF5}"/>
               </a:ext>
               <a:ext uri="{C183D7F6-B498-43B3-948B-1728B52AA6E4}">
-                <adec:decorative xmlns:adec="http://schemas.microsoft.com/office/drawing/2017/decorative" xmlns="" val="1"/>
+                <adec:decorative xmlns="" xmlns:adec="http://schemas.microsoft.com/office/drawing/2017/decorative" val="1"/>
               </a:ext>
             </a:extLst>
           </p:cNvPr>
@@ -11543,28 +11564,36 @@
         <p:spPr>
           <a:xfrm>
             <a:off x="673754" y="2160590"/>
-            <a:ext cx="3973943" cy="3440110"/>
+            <a:ext cx="4365501" cy="3440110"/>
           </a:xfrm>
         </p:spPr>
         <p:txBody>
           <a:bodyPr>
-            <a:normAutofit fontScale="92500"/>
+            <a:normAutofit/>
           </a:bodyPr>
           <a:lstStyle/>
           <a:p>
             <a:r>
-              <a:rPr lang="en-US" sz="1700">
+              <a:rPr lang="en-US" sz="1700" dirty="0" err="1">
                 <a:solidFill>
                   <a:schemeClr val="bg1"/>
                 </a:solidFill>
               </a:rPr>
-              <a:t>Buildtest is a framework that:</a:t>
+              <a:t>Buildtest</a:t>
+            </a:r>
+            <a:r>
+              <a:rPr lang="en-US" sz="1700" dirty="0">
+                <a:solidFill>
+                  <a:schemeClr val="bg1"/>
+                </a:solidFill>
+              </a:rPr>
+              <a:t> is a framework that:</a:t>
             </a:r>
           </a:p>
           <a:p>
             <a:pPr lvl="1"/>
             <a:r>
-              <a:rPr lang="en-US" sz="1700">
+              <a:rPr lang="en-US" sz="1700" dirty="0">
                 <a:solidFill>
                   <a:schemeClr val="bg1"/>
                 </a:solidFill>
@@ -11575,7 +11604,7 @@
           <a:p>
             <a:pPr lvl="1"/>
             <a:r>
-              <a:rPr lang="en-US" sz="1700">
+              <a:rPr lang="en-US" sz="1700" dirty="0">
                 <a:solidFill>
                   <a:schemeClr val="bg1"/>
                 </a:solidFill>
@@ -11586,7 +11615,7 @@
           <a:p>
             <a:pPr lvl="1"/>
             <a:r>
-              <a:rPr lang="en-US" sz="1700">
+              <a:rPr lang="en-US" sz="1700" dirty="0">
                 <a:solidFill>
                   <a:schemeClr val="bg1"/>
                 </a:solidFill>
@@ -11597,7 +11626,7 @@
           <a:p>
             <a:pPr lvl="1"/>
             <a:r>
-              <a:rPr lang="en-US" sz="1700">
+              <a:rPr lang="en-US" sz="1700" dirty="0">
                 <a:solidFill>
                   <a:schemeClr val="bg1"/>
                 </a:solidFill>
@@ -11607,16 +11636,24 @@
           </a:p>
           <a:p>
             <a:r>
-              <a:rPr lang="en-US" sz="1700">
+              <a:rPr lang="en-US" sz="1700" dirty="0" err="1">
                 <a:solidFill>
                   <a:schemeClr val="bg1"/>
                 </a:solidFill>
               </a:rPr>
-              <a:t>Buildtest comes with a repository of test configuration and source files</a:t>
-            </a:r>
-          </a:p>
-          <a:p>
-            <a:endParaRPr lang="en-US" sz="1700">
+              <a:t>Buildtest</a:t>
+            </a:r>
+            <a:r>
+              <a:rPr lang="en-US" sz="1700" dirty="0">
+                <a:solidFill>
+                  <a:schemeClr val="bg1"/>
+                </a:solidFill>
+              </a:rPr>
+              <a:t> comes with a repository of test configuration and source files</a:t>
+            </a:r>
+          </a:p>
+          <a:p>
+            <a:endParaRPr lang="en-US" sz="1700" dirty="0">
               <a:solidFill>
                 <a:schemeClr val="bg1"/>
               </a:solidFill>
@@ -11721,7 +11758,7 @@
                 <a16:creationId xmlns:a16="http://schemas.microsoft.com/office/drawing/2014/main" id="{B2205F6E-03C6-4E92-877C-E2482F6599AA}"/>
               </a:ext>
               <a:ext uri="{C183D7F6-B498-43B3-948B-1728B52AA6E4}">
-                <adec:decorative xmlns:adec="http://schemas.microsoft.com/office/drawing/2017/decorative" xmlns="" val="1"/>
+                <adec:decorative xmlns="" xmlns:adec="http://schemas.microsoft.com/office/drawing/2017/decorative" val="1"/>
               </a:ext>
             </a:extLst>
           </p:cNvPr>
@@ -13322,8 +13359,8 @@
         </p:nvSpPr>
         <p:spPr>
           <a:xfrm>
-            <a:off x="4975667" y="4033757"/>
-            <a:ext cx="2851597" cy="215444"/>
+            <a:off x="4975668" y="4033757"/>
+            <a:ext cx="1443606" cy="215444"/>
           </a:xfrm>
           <a:prstGeom prst="rect">
             <a:avLst/>
@@ -13347,8 +13384,21 @@
                   <a:schemeClr val="bg1"/>
                 </a:solidFill>
               </a:rPr>
-              <a:t>Passing flags to C compiler by setting CFLAGS variable</a:t>
-            </a:r>
+              <a:t>Passing flags to C </a:t>
+            </a:r>
+            <a:r>
+              <a:rPr lang="en-US" sz="800" dirty="0" smtClean="0">
+                <a:solidFill>
+                  <a:schemeClr val="bg1"/>
+                </a:solidFill>
+              </a:rPr>
+              <a:t>compiler</a:t>
+            </a:r>
+            <a:endParaRPr lang="en-US" sz="800" dirty="0">
+              <a:solidFill>
+                <a:schemeClr val="bg1"/>
+              </a:solidFill>
+            </a:endParaRPr>
           </a:p>
         </p:txBody>
       </p:sp>
@@ -13393,8 +13443,8 @@
         </p:nvSpPr>
         <p:spPr>
           <a:xfrm>
-            <a:off x="5494021" y="4726280"/>
-            <a:ext cx="1820612" cy="215444"/>
+            <a:off x="5494020" y="4726280"/>
+            <a:ext cx="1932015" cy="215444"/>
           </a:xfrm>
           <a:prstGeom prst="rect">
             <a:avLst/>
@@ -13418,8 +13468,21 @@
                   <a:schemeClr val="bg1"/>
                 </a:solidFill>
               </a:rPr>
-              <a:t>Passing Arguments to the Execution</a:t>
-            </a:r>
+              <a:t>Passing Arguments to the </a:t>
+            </a:r>
+            <a:r>
+              <a:rPr lang="en-US" sz="800" dirty="0" smtClean="0">
+                <a:solidFill>
+                  <a:schemeClr val="bg1"/>
+                </a:solidFill>
+              </a:rPr>
+              <a:t>Executable</a:t>
+            </a:r>
+            <a:endParaRPr lang="en-US" sz="800" dirty="0">
+              <a:solidFill>
+                <a:schemeClr val="bg1"/>
+              </a:solidFill>
+            </a:endParaRPr>
           </a:p>
         </p:txBody>
       </p:sp>
@@ -13603,6 +13666,31 @@
       </p:sp>
       <p:sp>
         <p:nvSpPr>
+          <p:cNvPr id="3" name="Content Placeholder 2">
+            <a:extLst>
+              <a:ext uri="{FF2B5EF4-FFF2-40B4-BE49-F238E27FC236}">
+                <a16:creationId xmlns:a16="http://schemas.microsoft.com/office/drawing/2014/main" id="{14D78349-62DB-4F29-9ACC-643A6D324494}"/>
+              </a:ext>
+            </a:extLst>
+          </p:cNvPr>
+          <p:cNvSpPr>
+            <a:spLocks noGrp="1"/>
+          </p:cNvSpPr>
+          <p:nvPr>
+            <p:ph idx="1"/>
+          </p:nvPr>
+        </p:nvSpPr>
+        <p:spPr/>
+        <p:txBody>
+          <a:bodyPr/>
+          <a:lstStyle/>
+          <a:p>
+            <a:endParaRPr lang="en-US" dirty="0"/>
+          </a:p>
+        </p:txBody>
+      </p:sp>
+      <p:sp>
+        <p:nvSpPr>
           <p:cNvPr id="5" name="Slide Number Placeholder 4">
             <a:extLst>
               <a:ext uri="{FF2B5EF4-FFF2-40B4-BE49-F238E27FC236}">
@@ -13647,13 +13735,13 @@
         </p:nvPicPr>
         <p:blipFill rotWithShape="1">
           <a:blip r:embed="rId3"/>
-          <a:srcRect l="23934" t="63702" r="50000" b="14086"/>
+          <a:srcRect l="25414" t="63702" r="49825" b="14086"/>
           <a:stretch/>
         </p:blipFill>
         <p:spPr>
           <a:xfrm>
-            <a:off x="400253" y="2915474"/>
-            <a:ext cx="4209821" cy="1943100"/>
+            <a:off x="-28280" y="2522746"/>
+            <a:ext cx="3999123" cy="1943100"/>
           </a:xfrm>
           <a:prstGeom prst="rect">
             <a:avLst/>
@@ -13681,8 +13769,8 @@
         </p:blipFill>
         <p:spPr>
           <a:xfrm>
-            <a:off x="4687410" y="1639900"/>
-            <a:ext cx="7284935" cy="4653304"/>
+            <a:off x="4133234" y="1713787"/>
+            <a:ext cx="8046236" cy="5139591"/>
           </a:xfrm>
           <a:prstGeom prst="rect">
             <a:avLst/>
@@ -13700,17 +13788,18 @@
           </p:cNvPr>
           <p:cNvCxnSpPr>
             <a:cxnSpLocks/>
+            <a:stCxn id="18" idx="2"/>
           </p:cNvCxnSpPr>
           <p:nvPr/>
         </p:nvCxnSpPr>
         <p:spPr>
           <a:xfrm rot="5400000">
-            <a:off x="5997228" y="2017517"/>
-            <a:ext cx="2396051" cy="2020466"/>
+            <a:off x="5579705" y="2180505"/>
+            <a:ext cx="2629744" cy="2145791"/>
           </a:xfrm>
           <a:prstGeom prst="bentConnector3">
             <a:avLst>
-              <a:gd name="adj1" fmla="val 100188"/>
+              <a:gd name="adj1" fmla="val 99839"/>
             </a:avLst>
           </a:prstGeom>
           <a:ln>
@@ -13748,12 +13837,12 @@
         </p:nvCxnSpPr>
         <p:spPr>
           <a:xfrm>
-            <a:off x="1826237" y="4225775"/>
-            <a:ext cx="3242913" cy="825691"/>
+            <a:off x="1308083" y="3801044"/>
+            <a:ext cx="3226972" cy="1670465"/>
           </a:xfrm>
           <a:prstGeom prst="bentConnector3">
             <a:avLst>
-              <a:gd name="adj1" fmla="val 59034"/>
+              <a:gd name="adj1" fmla="val 45134"/>
             </a:avLst>
           </a:prstGeom>
           <a:ln>
@@ -13791,12 +13880,12 @@
         </p:nvCxnSpPr>
         <p:spPr>
           <a:xfrm>
-            <a:off x="2062104" y="3889880"/>
-            <a:ext cx="3004562" cy="831579"/>
+            <a:off x="1366227" y="3453248"/>
+            <a:ext cx="3168828" cy="1667485"/>
           </a:xfrm>
           <a:prstGeom prst="bentConnector3">
             <a:avLst>
-              <a:gd name="adj1" fmla="val 78661"/>
+              <a:gd name="adj1" fmla="val 55830"/>
             </a:avLst>
           </a:prstGeom>
           <a:ln>
@@ -13818,58 +13907,6 @@
           </a:fontRef>
         </p:style>
       </p:cxnSp>
-      <p:sp>
-        <p:nvSpPr>
-          <p:cNvPr id="31" name="Oval 30">
-            <a:extLst>
-              <a:ext uri="{FF2B5EF4-FFF2-40B4-BE49-F238E27FC236}">
-                <a16:creationId xmlns:a16="http://schemas.microsoft.com/office/drawing/2014/main" id="{E0E1CCFD-50CA-42C8-8D91-CE19C69B3D1A}"/>
-              </a:ext>
-            </a:extLst>
-          </p:cNvPr>
-          <p:cNvSpPr/>
-          <p:nvPr/>
-        </p:nvSpPr>
-        <p:spPr>
-          <a:xfrm>
-            <a:off x="7927759" y="1639900"/>
-            <a:ext cx="555456" cy="233288"/>
-          </a:xfrm>
-          <a:prstGeom prst="ellipse">
-            <a:avLst/>
-          </a:prstGeom>
-          <a:noFill/>
-          <a:ln>
-            <a:solidFill>
-              <a:srgbClr val="3366CC"/>
-            </a:solidFill>
-          </a:ln>
-        </p:spPr>
-        <p:style>
-          <a:lnRef idx="2">
-            <a:schemeClr val="accent1">
-              <a:shade val="50000"/>
-            </a:schemeClr>
-          </a:lnRef>
-          <a:fillRef idx="1">
-            <a:schemeClr val="accent1"/>
-          </a:fillRef>
-          <a:effectRef idx="0">
-            <a:schemeClr val="accent1"/>
-          </a:effectRef>
-          <a:fontRef idx="minor">
-            <a:schemeClr val="lt1"/>
-          </a:fontRef>
-        </p:style>
-        <p:txBody>
-          <a:bodyPr rtlCol="0" anchor="ctr"/>
-          <a:lstStyle/>
-          <a:p>
-            <a:pPr algn="ctr"/>
-            <a:endParaRPr lang="en-US"/>
-          </a:p>
-        </p:txBody>
-      </p:sp>
       <p:cxnSp>
         <p:nvCxnSpPr>
           <p:cNvPr id="34" name="Connector: Elbow 33">
@@ -13886,12 +13923,12 @@
         </p:nvCxnSpPr>
         <p:spPr>
           <a:xfrm>
-            <a:off x="1982283" y="4020361"/>
-            <a:ext cx="3081898" cy="906746"/>
+            <a:off x="1308083" y="3630543"/>
+            <a:ext cx="3226972" cy="1663671"/>
           </a:xfrm>
           <a:prstGeom prst="bentConnector3">
             <a:avLst>
-              <a:gd name="adj1" fmla="val 74197"/>
+              <a:gd name="adj1" fmla="val 50000"/>
             </a:avLst>
           </a:prstGeom>
           <a:ln>
@@ -13927,8 +13964,8 @@
         </p:nvCxnSpPr>
         <p:spPr>
           <a:xfrm rot="16200000" flipH="1">
-            <a:off x="4563123" y="5051393"/>
-            <a:ext cx="763479" cy="514905"/>
+            <a:off x="3954710" y="5476555"/>
+            <a:ext cx="921265" cy="564213"/>
           </a:xfrm>
           <a:prstGeom prst="bentConnector3">
             <a:avLst/>
@@ -13952,16 +13989,65 @@
           </a:fontRef>
         </p:style>
       </p:cxnSp>
+      <p:sp>
+        <p:nvSpPr>
+          <p:cNvPr id="18" name="Rectangle 17"/>
+          <p:cNvSpPr/>
+          <p:nvPr/>
+        </p:nvSpPr>
+        <p:spPr>
+          <a:xfrm>
+            <a:off x="7668768" y="1713787"/>
+            <a:ext cx="597408" cy="224741"/>
+          </a:xfrm>
+          <a:prstGeom prst="rect">
+            <a:avLst/>
+          </a:prstGeom>
+          <a:noFill/>
+        </p:spPr>
+        <p:style>
+          <a:lnRef idx="2">
+            <a:schemeClr val="accent1">
+              <a:shade val="50000"/>
+            </a:schemeClr>
+          </a:lnRef>
+          <a:fillRef idx="1">
+            <a:schemeClr val="accent1"/>
+          </a:fillRef>
+          <a:effectRef idx="0">
+            <a:schemeClr val="accent1"/>
+          </a:effectRef>
+          <a:fontRef idx="minor">
+            <a:schemeClr val="lt1"/>
+          </a:fontRef>
+        </p:style>
+        <p:txBody>
+          <a:bodyPr rtlCol="0" anchor="ctr"/>
+          <a:lstStyle/>
+          <a:p>
+            <a:pPr algn="ctr"/>
+            <a:endParaRPr lang="en-US"/>
+          </a:p>
+        </p:txBody>
+      </p:sp>
     </p:spTree>
     <p:extLst>
       <p:ext uri="{BB962C8B-B14F-4D97-AF65-F5344CB8AC3E}">
-        <p14:creationId xmlns:p14="http://schemas.microsoft.com/office/powerpoint/2010/main" val="1472457805"/>
+        <p14:creationId xmlns:p14="http://schemas.microsoft.com/office/powerpoint/2010/main" val="260413183"/>
       </p:ext>
     </p:extLst>
   </p:cSld>
   <p:clrMapOvr>
     <a:masterClrMapping/>
   </p:clrMapOvr>
+  <mc:AlternateContent xmlns:mc="http://schemas.openxmlformats.org/markup-compatibility/2006" xmlns:p14="http://schemas.microsoft.com/office/powerpoint/2010/main">
+    <mc:Choice Requires="p14">
+      <p:transition spd="slow" p14:dur="2000" advTm="53924"/>
+    </mc:Choice>
+    <mc:Fallback xmlns="">
+      <p:transition spd="slow" advTm="53924"/>
+    </mc:Fallback>
+  </mc:AlternateContent>
   <p:timing>
     <p:tnLst>
       <p:par>

</xml_diff>